<commit_message>
UPDATE DO PPT 100% e exportação em pdf, JA ENTREGUE
</commit_message>
<xml_diff>
--- a/documentacao/Especificacao_Sistema_Informacao/android/IPL-TeSP-AMSI-SARAMAGO.pptx
+++ b/documentacao/Especificacao_Sistema_Informacao/android/IPL-TeSP-AMSI-SARAMAGO.pptx
@@ -14967,7 +14967,7 @@
           <p:nvPr>
             <p:extLst>
               <p:ext uri="{D42A27DB-BD31-4B8C-83A1-F6EECF244321}">
-                <p14:modId xmlns:p14="http://schemas.microsoft.com/office/powerpoint/2010/main" val="1753077987"/>
+                <p14:modId xmlns:p14="http://schemas.microsoft.com/office/powerpoint/2010/main" val="3934023192"/>
               </p:ext>
             </p:extLst>
           </p:nvPr>
@@ -15218,7 +15218,7 @@
                     <a:p>
                       <a:r>
                         <a:rPr lang="pt-PT" sz="1100" dirty="0"/>
-                        <a:t>05/12</a:t>
+                        <a:t>12/12</a:t>
                       </a:r>
                     </a:p>
                   </a:txBody>
@@ -15238,7 +15238,7 @@
                     <a:p>
                       <a:r>
                         <a:rPr lang="pt-PT" sz="1100" dirty="0"/>
-                        <a:t>06/12</a:t>
+                        <a:t>14/12</a:t>
                       </a:r>
                     </a:p>
                   </a:txBody>
@@ -15258,7 +15258,7 @@
                     <a:p>
                       <a:r>
                         <a:rPr lang="pt-PT" sz="1100" dirty="0"/>
-                        <a:t>08/12</a:t>
+                        <a:t>16/12</a:t>
                       </a:r>
                     </a:p>
                   </a:txBody>
@@ -19572,12 +19572,12 @@
               <a:t>Pretende-se conceber uma aplicação </a:t>
             </a:r>
             <a:r>
-              <a:rPr lang="pt-PT" i="1" dirty="0" err="1"/>
+              <a:rPr lang="pt-PT" i="1" dirty="0"/>
               <a:t>android</a:t>
             </a:r>
             <a:r>
               <a:rPr lang="pt-PT" dirty="0"/>
-              <a:t> complementar para um sistemas integrado de gestão de bibliotecas, onde se faça desde a gestão de documentação aos seus aos empréstimos efetuados pelos seus leitores.</a:t>
+              <a:t> complementar para um sistema integrado de gestão de bibliotecas, onde se faça desde a gestão de documentação aos seus aos empréstimos efetuados pelos seus leitores.</a:t>
             </a:r>
           </a:p>
           <a:p>

</xml_diff>